<commit_message>
Update presentation in English
</commit_message>
<xml_diff>
--- a/Documents/Presentation.pptx
+++ b/Documents/Presentation.pptx
@@ -110,6 +110,11 @@
       </a:defRPr>
     </a:lvl9pPr>
   </p:defaultTextStyle>
+  <p:extLst>
+    <p:ext uri="{EFAFB233-063F-42B5-8137-9DF3F51BA10A}">
+      <p15:sldGuideLst xmlns:p15="http://schemas.microsoft.com/office/powerpoint/2012/main"/>
+    </p:ext>
+  </p:extLst>
 </p:presentation>
 </file>
 
@@ -339,7 +344,7 @@
           <a:p>
             <a:fld id="{72230D28-D1D2-4E1B-AFCC-462068E479B1}" type="datetimeFigureOut">
               <a:rPr lang="en-US" smtClean="0"/>
-              <a:t>4/21/2021</a:t>
+              <a:t>4/26/2021</a:t>
             </a:fld>
             <a:endParaRPr lang="en-US"/>
           </a:p>
@@ -547,7 +552,7 @@
           <a:p>
             <a:fld id="{72230D28-D1D2-4E1B-AFCC-462068E479B1}" type="datetimeFigureOut">
               <a:rPr lang="en-US" smtClean="0"/>
-              <a:t>4/21/2021</a:t>
+              <a:t>4/26/2021</a:t>
             </a:fld>
             <a:endParaRPr lang="en-US"/>
           </a:p>
@@ -803,7 +808,7 @@
           <a:p>
             <a:fld id="{72230D28-D1D2-4E1B-AFCC-462068E479B1}" type="datetimeFigureOut">
               <a:rPr lang="en-US" smtClean="0"/>
-              <a:t>4/21/2021</a:t>
+              <a:t>4/26/2021</a:t>
             </a:fld>
             <a:endParaRPr lang="en-US"/>
           </a:p>
@@ -973,7 +978,7 @@
           <a:p>
             <a:fld id="{72230D28-D1D2-4E1B-AFCC-462068E479B1}" type="datetimeFigureOut">
               <a:rPr lang="en-US" smtClean="0"/>
-              <a:t>4/21/2021</a:t>
+              <a:t>4/26/2021</a:t>
             </a:fld>
             <a:endParaRPr lang="en-US"/>
           </a:p>
@@ -1316,7 +1321,7 @@
           <a:p>
             <a:fld id="{72230D28-D1D2-4E1B-AFCC-462068E479B1}" type="datetimeFigureOut">
               <a:rPr lang="en-US" smtClean="0"/>
-              <a:t>4/21/2021</a:t>
+              <a:t>4/26/2021</a:t>
             </a:fld>
             <a:endParaRPr lang="en-US"/>
           </a:p>
@@ -1591,7 +1596,7 @@
           <a:p>
             <a:fld id="{72230D28-D1D2-4E1B-AFCC-462068E479B1}" type="datetimeFigureOut">
               <a:rPr lang="en-US" smtClean="0"/>
-              <a:t>4/21/2021</a:t>
+              <a:t>4/26/2021</a:t>
             </a:fld>
             <a:endParaRPr lang="en-US"/>
           </a:p>
@@ -1970,7 +1975,7 @@
           <a:p>
             <a:fld id="{72230D28-D1D2-4E1B-AFCC-462068E479B1}" type="datetimeFigureOut">
               <a:rPr lang="en-US" smtClean="0"/>
-              <a:t>4/21/2021</a:t>
+              <a:t>4/26/2021</a:t>
             </a:fld>
             <a:endParaRPr lang="en-US"/>
           </a:p>
@@ -2088,7 +2093,7 @@
           <a:p>
             <a:fld id="{72230D28-D1D2-4E1B-AFCC-462068E479B1}" type="datetimeFigureOut">
               <a:rPr lang="en-US" smtClean="0"/>
-              <a:t>4/21/2021</a:t>
+              <a:t>4/26/2021</a:t>
             </a:fld>
             <a:endParaRPr lang="en-US"/>
           </a:p>
@@ -2259,7 +2264,7 @@
           <a:p>
             <a:fld id="{72230D28-D1D2-4E1B-AFCC-462068E479B1}" type="datetimeFigureOut">
               <a:rPr lang="en-US" smtClean="0"/>
-              <a:t>4/21/2021</a:t>
+              <a:t>4/26/2021</a:t>
             </a:fld>
             <a:endParaRPr lang="en-US"/>
           </a:p>
@@ -2613,7 +2618,7 @@
           <a:p>
             <a:fld id="{72230D28-D1D2-4E1B-AFCC-462068E479B1}" type="datetimeFigureOut">
               <a:rPr lang="en-US" smtClean="0"/>
-              <a:t>4/21/2021</a:t>
+              <a:t>4/26/2021</a:t>
             </a:fld>
             <a:endParaRPr lang="en-US"/>
           </a:p>
@@ -2990,7 +2995,7 @@
           <a:p>
             <a:fld id="{72230D28-D1D2-4E1B-AFCC-462068E479B1}" type="datetimeFigureOut">
               <a:rPr lang="en-US" smtClean="0"/>
-              <a:t>4/21/2021</a:t>
+              <a:t>4/26/2021</a:t>
             </a:fld>
             <a:endParaRPr lang="en-US"/>
           </a:p>
@@ -3277,7 +3282,7 @@
           <a:p>
             <a:fld id="{72230D28-D1D2-4E1B-AFCC-462068E479B1}" type="datetimeFigureOut">
               <a:rPr lang="en-US" smtClean="0"/>
-              <a:t>4/21/2021</a:t>
+              <a:t>4/26/2021</a:t>
             </a:fld>
             <a:endParaRPr lang="en-US"/>
           </a:p>
@@ -4207,12 +4212,12 @@
           <a:lstStyle/>
           <a:p>
             <a:r>
-              <a:rPr lang="bg-BG" dirty="0">
+              <a:rPr lang="en-US">
                 <a:latin typeface="+mn-lt"/>
                 <a:ea typeface="+mn-ea"/>
                 <a:cs typeface="+mn-cs"/>
               </a:rPr>
-              <a:t>Нашият отбор</a:t>
+              <a:t>Contributors</a:t>
             </a:r>
             <a:endParaRPr lang="en-US" dirty="0">
               <a:latin typeface="+mn-lt"/>
@@ -4296,10 +4301,12 @@
               <a:t>• </a:t>
             </a:r>
             <a:r>
-              <a:rPr lang="bg-BG" b="0" i="0" dirty="0">
-                <a:effectLst/>
-              </a:rPr>
-              <a:t>Георги Малчев</a:t>
+              <a:rPr lang="en-US" dirty="0"/>
+              <a:t>George </a:t>
+            </a:r>
+            <a:r>
+              <a:rPr lang="en-US" dirty="0" err="1"/>
+              <a:t>Malchev</a:t>
             </a:r>
             <a:r>
               <a:rPr lang="en-US" b="0" i="0" dirty="0">
@@ -4313,19 +4320,7 @@
               <a:rPr lang="en-US" b="0" i="0" dirty="0">
                 <a:effectLst/>
               </a:rPr>
-              <a:t>• </a:t>
-            </a:r>
-            <a:r>
-              <a:rPr lang="bg-BG" b="0" i="0" dirty="0">
-                <a:effectLst/>
-              </a:rPr>
-              <a:t>Иван Михайлов</a:t>
-            </a:r>
-            <a:r>
-              <a:rPr lang="en-US" b="0" i="0" dirty="0">
-                <a:effectLst/>
-              </a:rPr>
-              <a:t>(INMihaylov19) - Frontend developer</a:t>
+              <a:t>• Ivan Mihaylov(INMihaylov19) - Frontend developer</a:t>
             </a:r>
           </a:p>
           <a:p>
@@ -4336,10 +4331,12 @@
               <a:t>• </a:t>
             </a:r>
             <a:r>
-              <a:rPr lang="bg-BG" b="0" i="0" dirty="0">
-                <a:effectLst/>
-              </a:rPr>
-              <a:t>Егор Семенов</a:t>
+              <a:rPr lang="en-US" dirty="0" err="1"/>
+              <a:t>Egor</a:t>
+            </a:r>
+            <a:r>
+              <a:rPr lang="en-US" dirty="0"/>
+              <a:t> Semenov</a:t>
             </a:r>
             <a:r>
               <a:rPr lang="en-US" b="0" i="0" dirty="0">
@@ -4356,10 +4353,8 @@
               <a:t>• </a:t>
             </a:r>
             <a:r>
-              <a:rPr lang="bg-BG" b="0" i="0" dirty="0">
-                <a:effectLst/>
-              </a:rPr>
-              <a:t>Николай Димитров</a:t>
+              <a:rPr lang="en-US" dirty="0"/>
+              <a:t>Nikolay Dimitrov</a:t>
             </a:r>
             <a:r>
               <a:rPr lang="en-US" b="0" i="0" dirty="0">
@@ -4759,20 +4754,14 @@
           <a:lstStyle/>
           <a:p>
             <a:r>
-              <a:rPr lang="en-US" dirty="0" err="1">
+              <a:rPr lang="en-US" dirty="0">
                 <a:solidFill>
                   <a:srgbClr val="FFFFFF"/>
                 </a:solidFill>
                 <a:latin typeface="+mn-lt"/>
               </a:rPr>
-              <a:t>Тема</a:t>
-            </a:r>
-            <a:endParaRPr lang="en-US" dirty="0">
-              <a:solidFill>
-                <a:srgbClr val="FFFFFF"/>
-              </a:solidFill>
-              <a:latin typeface="+mn-lt"/>
-            </a:endParaRPr>
+              <a:t>Topic</a:t>
+            </a:r>
           </a:p>
         </p:txBody>
       </p:sp>
@@ -5123,17 +5112,6 @@
           <a:lstStyle/>
           <a:p>
             <a:r>
-              <a:rPr lang="en-US" sz="7400" dirty="0" err="1">
-                <a:solidFill>
-                  <a:schemeClr val="tx1">
-                    <a:lumMod val="85000"/>
-                    <a:lumOff val="15000"/>
-                  </a:schemeClr>
-                </a:solidFill>
-              </a:rPr>
-              <a:t>Етапи</a:t>
-            </a:r>
-            <a:r>
               <a:rPr lang="en-US" sz="7400" dirty="0">
                 <a:solidFill>
                   <a:schemeClr val="tx1">
@@ -5142,49 +5120,8 @@
                   </a:schemeClr>
                 </a:solidFill>
               </a:rPr>
-              <a:t> </a:t>
-            </a:r>
-            <a:r>
-              <a:rPr lang="en-US" sz="7400" dirty="0" err="1">
-                <a:solidFill>
-                  <a:schemeClr val="tx1">
-                    <a:lumMod val="85000"/>
-                    <a:lumOff val="15000"/>
-                  </a:schemeClr>
-                </a:solidFill>
-              </a:rPr>
-              <a:t>на</a:t>
-            </a:r>
-            <a:r>
-              <a:rPr lang="en-US" sz="7400" dirty="0">
-                <a:solidFill>
-                  <a:schemeClr val="tx1">
-                    <a:lumMod val="85000"/>
-                    <a:lumOff val="15000"/>
-                  </a:schemeClr>
-                </a:solidFill>
-              </a:rPr>
-              <a:t> </a:t>
-            </a:r>
-            <a:r>
-              <a:rPr lang="en-US" sz="7400" dirty="0" err="1">
-                <a:solidFill>
-                  <a:schemeClr val="tx1">
-                    <a:lumMod val="85000"/>
-                    <a:lumOff val="15000"/>
-                  </a:schemeClr>
-                </a:solidFill>
-              </a:rPr>
-              <a:t>реализация</a:t>
-            </a:r>
-            <a:endParaRPr lang="en-US" sz="7400" dirty="0">
-              <a:solidFill>
-                <a:schemeClr val="tx1">
-                  <a:lumMod val="85000"/>
-                  <a:lumOff val="15000"/>
-                </a:schemeClr>
-              </a:solidFill>
-            </a:endParaRPr>
+              <a:t>Milestones of realization</a:t>
+            </a:r>
           </a:p>
         </p:txBody>
       </p:sp>
@@ -5685,7 +5622,7 @@
           <a:lstStyle/>
           <a:p>
             <a:r>
-              <a:rPr lang="en-US" sz="6000">
+              <a:rPr lang="en-US" sz="6000" dirty="0">
                 <a:solidFill>
                   <a:schemeClr val="tx1">
                     <a:lumMod val="85000"/>
@@ -5693,7 +5630,7 @@
                   </a:schemeClr>
                 </a:solidFill>
               </a:rPr>
-              <a:t>Използвани технологии</a:t>
+              <a:t>Used technologies</a:t>
             </a:r>
           </a:p>
         </p:txBody>
@@ -6366,7 +6303,7 @@
           <a:lstStyle/>
           <a:p>
             <a:r>
-              <a:rPr lang="en-US" sz="6000">
+              <a:rPr lang="en-US" sz="6000" dirty="0">
                 <a:solidFill>
                   <a:schemeClr val="tx1">
                     <a:lumMod val="85000"/>
@@ -6374,7 +6311,7 @@
                   </a:schemeClr>
                 </a:solidFill>
               </a:rPr>
-              <a:t>Бърз преглед на продукта</a:t>
+              <a:t>Quick review of the product</a:t>
             </a:r>
           </a:p>
         </p:txBody>
@@ -6975,7 +6912,7 @@
           <a:lstStyle/>
           <a:p>
             <a:r>
-              <a:rPr lang="en-US" sz="8000">
+              <a:rPr lang="en-US" sz="8000" dirty="0">
                 <a:solidFill>
                   <a:schemeClr val="tx1">
                     <a:lumMod val="85000"/>
@@ -6983,7 +6920,7 @@
                   </a:schemeClr>
                 </a:solidFill>
               </a:rPr>
-              <a:t>Благодарим за вниманието!!</a:t>
+              <a:t>Thank you for your attention!!</a:t>
             </a:r>
           </a:p>
         </p:txBody>

</xml_diff>